<commit_message>
Adding CL SciSumm 2018 overview paper from BIRNDL
</commit_message>
<xml_diff>
--- a/publications/MSRA_Academic_Day_2017/A1.pptx
+++ b/publications/MSRA_Academic_Day_2017/A1.pptx
@@ -735,11 +735,11 @@
           <c:showBubbleSize val="0"/>
         </c:dLbls>
         <c:gapWidth val="150"/>
-        <c:axId val="673205024"/>
-        <c:axId val="591830176"/>
+        <c:axId val="-1002466832"/>
+        <c:axId val="-1002463872"/>
       </c:barChart>
       <c:catAx>
-        <c:axId val="673205024"/>
+        <c:axId val="-1002466832"/>
         <c:scaling>
           <c:orientation val="minMax"/>
         </c:scaling>
@@ -779,7 +779,7 @@
             <a:endParaRPr lang="en-US"/>
           </a:p>
         </c:txPr>
-        <c:crossAx val="591830176"/>
+        <c:crossAx val="-1002463872"/>
         <c:crosses val="autoZero"/>
         <c:auto val="1"/>
         <c:lblAlgn val="ctr"/>
@@ -787,7 +787,7 @@
         <c:noMultiLvlLbl val="0"/>
       </c:catAx>
       <c:valAx>
-        <c:axId val="591830176"/>
+        <c:axId val="-1002463872"/>
         <c:scaling>
           <c:orientation val="minMax"/>
           <c:max val="0.3"/>
@@ -870,7 +870,7 @@
             <a:endParaRPr lang="en-US"/>
           </a:p>
         </c:txPr>
-        <c:crossAx val="673205024"/>
+        <c:crossAx val="-1002466832"/>
         <c:crosses val="autoZero"/>
         <c:crossBetween val="between"/>
         <c:majorUnit val="0.1"/>
@@ -1517,8 +1517,8 @@
           <c:showBubbleSize val="0"/>
         </c:dLbls>
         <c:gapWidth val="150"/>
-        <c:axId val="591546288"/>
-        <c:axId val="591537104"/>
+        <c:axId val="-968848288"/>
+        <c:axId val="-968845536"/>
         <c:extLst xmlns:c16r2="http://schemas.microsoft.com/office/drawing/2015/06/chart">
           <c:ext xmlns:c15="http://schemas.microsoft.com/office/drawing/2012/chart" uri="{02D57815-91ED-43cb-92C2-25804820EDAC}">
             <c15:filteredBarSeries>
@@ -1728,7 +1728,7 @@
                 <c:order val="3"/>
                 <c:tx>
                   <c:strRef>
-                    <c:extLst xmlns:c16r2="http://schemas.microsoft.com/office/drawing/2015/06/chart" xmlns:c15="http://schemas.microsoft.com/office/drawing/2012/chart">
+                    <c:extLst xmlns:c15="http://schemas.microsoft.com/office/drawing/2012/chart" xmlns:c16r2="http://schemas.microsoft.com/office/drawing/2015/06/chart">
                       <c:ext xmlns:c15="http://schemas.microsoft.com/office/drawing/2012/chart" uri="{02D57815-91ED-43cb-92C2-25804820EDAC}">
                         <c15:formulaRef>
                           <c15:sqref>Graph_Task1a_default2!$E$1</c15:sqref>
@@ -1746,7 +1746,7 @@
                 <c:invertIfNegative val="0"/>
                 <c:cat>
                   <c:strRef>
-                    <c:extLst xmlns:c16r2="http://schemas.microsoft.com/office/drawing/2015/06/chart" xmlns:c15="http://schemas.microsoft.com/office/drawing/2012/chart">
+                    <c:extLst xmlns:c15="http://schemas.microsoft.com/office/drawing/2012/chart" xmlns:c16r2="http://schemas.microsoft.com/office/drawing/2015/06/chart">
                       <c:ext xmlns:c15="http://schemas.microsoft.com/office/drawing/2012/chart" uri="{02D57815-91ED-43cb-92C2-25804820EDAC}">
                         <c15:formulaRef>
                           <c15:sqref>Graph_Task1a_default2!$A$2:$A$24</c15:sqref>
@@ -1829,7 +1829,7 @@
                 </c:cat>
                 <c:val>
                   <c:numRef>
-                    <c:extLst xmlns:c16r2="http://schemas.microsoft.com/office/drawing/2015/06/chart" xmlns:c15="http://schemas.microsoft.com/office/drawing/2012/chart">
+                    <c:extLst xmlns:c15="http://schemas.microsoft.com/office/drawing/2012/chart" xmlns:c16r2="http://schemas.microsoft.com/office/drawing/2015/06/chart">
                       <c:ext xmlns:c15="http://schemas.microsoft.com/office/drawing/2012/chart" uri="{02D57815-91ED-43cb-92C2-25804820EDAC}">
                         <c15:formulaRef>
                           <c15:sqref>Graph_Task1a_default2!$E$2:$E$24</c15:sqref>
@@ -1911,7 +1911,7 @@
                     </c:numCache>
                   </c:numRef>
                 </c:val>
-                <c:extLst xmlns:c16r2="http://schemas.microsoft.com/office/drawing/2015/06/chart" xmlns:c15="http://schemas.microsoft.com/office/drawing/2012/chart">
+                <c:extLst xmlns:c15="http://schemas.microsoft.com/office/drawing/2012/chart" xmlns:c16r2="http://schemas.microsoft.com/office/drawing/2015/06/chart">
                   <c:ext xmlns:c16="http://schemas.microsoft.com/office/drawing/2014/chart" uri="{C3380CC4-5D6E-409C-BE32-E72D297353CC}">
                     <c16:uniqueId val="{00000003-4E66-47E4-A5EE-56B9D2A8688D}"/>
                   </c:ext>
@@ -1922,7 +1922,7 @@
         </c:extLst>
       </c:barChart>
       <c:catAx>
-        <c:axId val="591546288"/>
+        <c:axId val="-968848288"/>
         <c:scaling>
           <c:orientation val="minMax"/>
         </c:scaling>
@@ -1962,7 +1962,7 @@
             <a:endParaRPr lang="en-US"/>
           </a:p>
         </c:txPr>
-        <c:crossAx val="591537104"/>
+        <c:crossAx val="-968845536"/>
         <c:crosses val="autoZero"/>
         <c:auto val="1"/>
         <c:lblAlgn val="ctr"/>
@@ -1970,7 +1970,7 @@
         <c:noMultiLvlLbl val="0"/>
       </c:catAx>
       <c:valAx>
-        <c:axId val="591537104"/>
+        <c:axId val="-968845536"/>
         <c:scaling>
           <c:orientation val="minMax"/>
           <c:min val="-0.05"/>
@@ -2053,7 +2053,7 @@
             <a:endParaRPr lang="en-US"/>
           </a:p>
         </c:txPr>
-        <c:crossAx val="591546288"/>
+        <c:crossAx val="-968848288"/>
         <c:crosses val="autoZero"/>
         <c:crossBetween val="between"/>
         <c:majorUnit val="0.1"/>
@@ -2454,7 +2454,7 @@
         <p:nvSpPr>
           <p:cNvPr id="4100" name="Rectangle 4"/>
           <p:cNvSpPr>
-            <a:spLocks noChangeArrowheads="1" noTextEdit="1"/>
+            <a:spLocks noGrp="1" noRot="1" noChangeAspect="1" noChangeArrowheads="1" noTextEdit="1"/>
           </p:cNvSpPr>
           <p:nvPr>
             <p:ph type="sldImg" idx="2"/>
@@ -7547,23 +7547,7 @@
                 <a:ea typeface="Segoe UI" panose="020B0502040204020203" pitchFamily="34" charset="0"/>
                 <a:cs typeface="Segoe UI" panose="020B0502040204020203" pitchFamily="34" charset="0"/>
               </a:rPr>
-              <a:t> </a:t>
-            </a:r>
-            <a:r>
-              <a:rPr lang="en-US" altLang="en-US" sz="2800" dirty="0" smtClean="0">
-                <a:latin typeface="Segoe UI" panose="020B0502040204020203" pitchFamily="34" charset="0"/>
-                <a:ea typeface="Segoe UI" panose="020B0502040204020203" pitchFamily="34" charset="0"/>
-                <a:cs typeface="Segoe UI" panose="020B0502040204020203" pitchFamily="34" charset="0"/>
-              </a:rPr>
-              <a:t>Pilot Shared Task @ </a:t>
-            </a:r>
-            <a:r>
-              <a:rPr lang="en-US" altLang="en-US" sz="2800" dirty="0" smtClean="0">
-                <a:latin typeface="Segoe UI" panose="020B0502040204020203" pitchFamily="34" charset="0"/>
-                <a:ea typeface="Segoe UI" panose="020B0502040204020203" pitchFamily="34" charset="0"/>
-                <a:cs typeface="Segoe UI" panose="020B0502040204020203" pitchFamily="34" charset="0"/>
-              </a:rPr>
-              <a:t/>
+              <a:t> Pilot Shared Task @ </a:t>
             </a:r>
             <a:br>
               <a:rPr lang="en-US" altLang="en-US" sz="2800" dirty="0" smtClean="0">
@@ -7578,15 +7562,7 @@
                 <a:ea typeface="Segoe UI" panose="020B0502040204020203" pitchFamily="34" charset="0"/>
                 <a:cs typeface="Segoe UI" panose="020B0502040204020203" pitchFamily="34" charset="0"/>
               </a:rPr>
-              <a:t>TAC, </a:t>
-            </a:r>
-            <a:r>
-              <a:rPr lang="en-US" altLang="en-US" sz="2800" dirty="0" smtClean="0">
-                <a:latin typeface="Segoe UI" panose="020B0502040204020203" pitchFamily="34" charset="0"/>
-                <a:ea typeface="Segoe UI" panose="020B0502040204020203" pitchFamily="34" charset="0"/>
-                <a:cs typeface="Segoe UI" panose="020B0502040204020203" pitchFamily="34" charset="0"/>
-              </a:rPr>
-              <a:t>MD, USA</a:t>
+              <a:t>TAC, MD, USA</a:t>
             </a:r>
           </a:p>
           <a:p>
@@ -7964,11 +7940,6 @@
               </a:rPr>
               <a:t>Where we are after 3 years?</a:t>
             </a:r>
-            <a:endParaRPr lang="en-US" altLang="en-US" sz="3400" b="1" dirty="0">
-              <a:latin typeface="Segoe UI" panose="020B0502040204020203" pitchFamily="34" charset="0"/>
-              <a:ea typeface="Segoe UI" panose="020B0502040204020203" pitchFamily="34" charset="0"/>
-              <a:cs typeface="Segoe UI" panose="020B0502040204020203" pitchFamily="34" charset="0"/>
-            </a:endParaRPr>
           </a:p>
         </p:txBody>
       </p:sp>
@@ -8034,21 +8005,8 @@
                 <a:ea typeface="Segoe UI" panose="020B0502040204020203" pitchFamily="34" charset="0"/>
                 <a:cs typeface="Segoe UI" panose="020B0502040204020203" pitchFamily="34" charset="0"/>
               </a:rPr>
-              <a:t> – </a:t>
-            </a:r>
-            <a:r>
-              <a:rPr lang="en-US" altLang="en-US" sz="3400" b="1" dirty="0">
-                <a:latin typeface="Segoe UI" panose="020B0502040204020203" pitchFamily="34" charset="0"/>
-                <a:ea typeface="Segoe UI" panose="020B0502040204020203" pitchFamily="34" charset="0"/>
-                <a:cs typeface="Segoe UI" panose="020B0502040204020203" pitchFamily="34" charset="0"/>
-              </a:rPr>
-              <a:t>16</a:t>
-            </a:r>
-            <a:endParaRPr lang="en-US" altLang="en-US" sz="3400" b="1" dirty="0">
-              <a:latin typeface="Segoe UI" panose="020B0502040204020203" pitchFamily="34" charset="0"/>
-              <a:ea typeface="Segoe UI" panose="020B0502040204020203" pitchFamily="34" charset="0"/>
-              <a:cs typeface="Segoe UI" panose="020B0502040204020203" pitchFamily="34" charset="0"/>
-            </a:endParaRPr>
+              <a:t> – 16</a:t>
+            </a:r>
           </a:p>
         </p:txBody>
       </p:sp>
@@ -8217,7 +8175,29 @@
                 <a:ea typeface="Segoe UI" charset="0"/>
                 <a:cs typeface="Segoe UI" charset="0"/>
               </a:rPr>
-              <a:t>the corpus form GitHub repo, accessible using this QR code.</a:t>
+              <a:t>the corpus </a:t>
+            </a:r>
+            <a:r>
+              <a:rPr lang="en-US" altLang="en-US" sz="3400" smtClean="0">
+                <a:solidFill>
+                  <a:srgbClr val="C00000"/>
+                </a:solidFill>
+                <a:latin typeface="Segoe UI" charset="0"/>
+                <a:ea typeface="Segoe UI" charset="0"/>
+                <a:cs typeface="Segoe UI" charset="0"/>
+              </a:rPr>
+              <a:t>from </a:t>
+            </a:r>
+            <a:r>
+              <a:rPr lang="en-US" altLang="en-US" sz="3400">
+                <a:solidFill>
+                  <a:srgbClr val="C00000"/>
+                </a:solidFill>
+                <a:latin typeface="Segoe UI" charset="0"/>
+                <a:ea typeface="Segoe UI" charset="0"/>
+                <a:cs typeface="Segoe UI" charset="0"/>
+              </a:rPr>
+              <a:t>GitHub repo, accessible using this QR code.</a:t>
             </a:r>
           </a:p>
           <a:p>
@@ -8227,7 +8207,7 @@
               </a:lnSpc>
             </a:pPr>
             <a:r>
-              <a:rPr lang="en-US" altLang="en-US" sz="2400" u="sng">
+              <a:rPr lang="en-US" altLang="en-US" sz="2400" u="sng" dirty="0">
                 <a:solidFill>
                   <a:schemeClr val="accent2"/>
                 </a:solidFill>
@@ -8235,7 +8215,51 @@
                 <a:ea typeface="Segoe UI" charset="0"/>
                 <a:cs typeface="Segoe UI" charset="0"/>
               </a:rPr>
-              <a:t>https://github.com/WING-NUS/scisumm-corpus</a:t>
+              <a:t>https://</a:t>
+            </a:r>
+            <a:r>
+              <a:rPr lang="en-US" altLang="en-US" sz="2400" u="sng" dirty="0" err="1">
+                <a:solidFill>
+                  <a:schemeClr val="accent2"/>
+                </a:solidFill>
+                <a:latin typeface="Segoe UI" charset="0"/>
+                <a:ea typeface="Segoe UI" charset="0"/>
+                <a:cs typeface="Segoe UI" charset="0"/>
+              </a:rPr>
+              <a:t>github.com</a:t>
+            </a:r>
+            <a:r>
+              <a:rPr lang="en-US" altLang="en-US" sz="2400" u="sng" dirty="0">
+                <a:solidFill>
+                  <a:schemeClr val="accent2"/>
+                </a:solidFill>
+                <a:latin typeface="Segoe UI" charset="0"/>
+                <a:ea typeface="Segoe UI" charset="0"/>
+                <a:cs typeface="Segoe UI" charset="0"/>
+              </a:rPr>
+              <a:t>/WING-NUS/</a:t>
+            </a:r>
+            <a:r>
+              <a:rPr lang="en-US" altLang="en-US" sz="2400" u="sng" dirty="0" err="1">
+                <a:solidFill>
+                  <a:schemeClr val="accent2"/>
+                </a:solidFill>
+                <a:latin typeface="Segoe UI" charset="0"/>
+                <a:ea typeface="Segoe UI" charset="0"/>
+                <a:cs typeface="Segoe UI" charset="0"/>
+              </a:rPr>
+              <a:t>scisumm</a:t>
+            </a:r>
+            <a:r>
+              <a:rPr lang="en-US" altLang="en-US" sz="2400" u="sng" dirty="0">
+                <a:solidFill>
+                  <a:schemeClr val="accent2"/>
+                </a:solidFill>
+                <a:latin typeface="Segoe UI" charset="0"/>
+                <a:ea typeface="Segoe UI" charset="0"/>
+                <a:cs typeface="Segoe UI" charset="0"/>
+              </a:rPr>
+              <a:t>-corpus</a:t>
             </a:r>
           </a:p>
         </p:txBody>
@@ -8988,15 +9012,7 @@
                 <a:ea typeface="Segoe UI" panose="020B0502040204020203" pitchFamily="34" charset="0"/>
                 <a:cs typeface="Segoe UI" panose="020B0502040204020203" pitchFamily="34" charset="0"/>
               </a:rPr>
-              <a:t>30 target papers; 500 citing papers; annotated by a 5+ </a:t>
-            </a:r>
-            <a:r>
-              <a:rPr lang="en-US" altLang="en-US" sz="2800" dirty="0" smtClean="0">
-                <a:latin typeface="Segoe UI" panose="020B0502040204020203" pitchFamily="34" charset="0"/>
-                <a:ea typeface="Segoe UI" panose="020B0502040204020203" pitchFamily="34" charset="0"/>
-                <a:cs typeface="Segoe UI" panose="020B0502040204020203" pitchFamily="34" charset="0"/>
-              </a:rPr>
-              <a:t>applied </a:t>
+              <a:t>30 target papers; 500 citing papers; annotated by a 5+ applied </a:t>
             </a:r>
             <a:r>
               <a:rPr lang="en-US" altLang="en-US" sz="2800" dirty="0">
@@ -9012,29 +9028,8 @@
                 <a:ea typeface="Segoe UI" panose="020B0502040204020203" pitchFamily="34" charset="0"/>
                 <a:cs typeface="Segoe UI" panose="020B0502040204020203" pitchFamily="34" charset="0"/>
               </a:rPr>
-              <a:t>inguistics students from U. Hyderabad</a:t>
-            </a:r>
-            <a:r>
-              <a:rPr lang="en-US" altLang="en-US" sz="2800" dirty="0" smtClean="0">
-                <a:latin typeface="Segoe UI" panose="020B0502040204020203" pitchFamily="34" charset="0"/>
-                <a:ea typeface="Segoe UI" panose="020B0502040204020203" pitchFamily="34" charset="0"/>
-                <a:cs typeface="Segoe UI" panose="020B0502040204020203" pitchFamily="34" charset="0"/>
-              </a:rPr>
-              <a:t>, </a:t>
-            </a:r>
-            <a:r>
-              <a:rPr lang="en-US" altLang="en-US" sz="2800" dirty="0" smtClean="0">
-                <a:latin typeface="Segoe UI" panose="020B0502040204020203" pitchFamily="34" charset="0"/>
-                <a:ea typeface="Segoe UI" panose="020B0502040204020203" pitchFamily="34" charset="0"/>
-                <a:cs typeface="Segoe UI" panose="020B0502040204020203" pitchFamily="34" charset="0"/>
-              </a:rPr>
-              <a:t>India</a:t>
-            </a:r>
-            <a:endParaRPr lang="en-US" altLang="en-US" sz="2800" dirty="0" smtClean="0">
-              <a:latin typeface="Segoe UI" panose="020B0502040204020203" pitchFamily="34" charset="0"/>
-              <a:ea typeface="Segoe UI" panose="020B0502040204020203" pitchFamily="34" charset="0"/>
-              <a:cs typeface="Segoe UI" panose="020B0502040204020203" pitchFamily="34" charset="0"/>
-            </a:endParaRPr>
+              <a:t>inguistics students from U. Hyderabad, India</a:t>
+            </a:r>
           </a:p>
           <a:p>
             <a:pPr eaLnBrk="1" hangingPunct="1">
@@ -9051,23 +9046,7 @@
                 <a:ea typeface="Segoe UI" panose="020B0502040204020203" pitchFamily="34" charset="0"/>
                 <a:cs typeface="Segoe UI" panose="020B0502040204020203" pitchFamily="34" charset="0"/>
               </a:rPr>
-              <a:t>Largest </a:t>
-            </a:r>
-            <a:r>
-              <a:rPr lang="en-US" altLang="en-US" sz="2800" dirty="0" smtClean="0">
-                <a:latin typeface="Segoe UI" panose="020B0502040204020203" pitchFamily="34" charset="0"/>
-                <a:ea typeface="Segoe UI" panose="020B0502040204020203" pitchFamily="34" charset="0"/>
-                <a:cs typeface="Segoe UI" panose="020B0502040204020203" pitchFamily="34" charset="0"/>
-              </a:rPr>
-              <a:t>corpus </a:t>
-            </a:r>
-            <a:r>
-              <a:rPr lang="en-US" altLang="en-US" sz="2800" dirty="0" smtClean="0">
-                <a:latin typeface="Segoe UI" panose="020B0502040204020203" pitchFamily="34" charset="0"/>
-                <a:ea typeface="Segoe UI" panose="020B0502040204020203" pitchFamily="34" charset="0"/>
-                <a:cs typeface="Segoe UI" panose="020B0502040204020203" pitchFamily="34" charset="0"/>
-              </a:rPr>
-              <a:t>in the world</a:t>
+              <a:t>Largest corpus in the world</a:t>
             </a:r>
           </a:p>
           <a:p>
@@ -9093,21 +9072,8 @@
                 <a:ea typeface="Segoe UI" panose="020B0502040204020203" pitchFamily="34" charset="0"/>
                 <a:cs typeface="Segoe UI" panose="020B0502040204020203" pitchFamily="34" charset="0"/>
               </a:rPr>
-              <a:t> – 16 @ </a:t>
-            </a:r>
-            <a:r>
-              <a:rPr lang="en-US" altLang="en-US" sz="2800" dirty="0" smtClean="0">
-                <a:latin typeface="Segoe UI" panose="020B0502040204020203" pitchFamily="34" charset="0"/>
-                <a:ea typeface="Segoe UI" panose="020B0502040204020203" pitchFamily="34" charset="0"/>
-                <a:cs typeface="Segoe UI" panose="020B0502040204020203" pitchFamily="34" charset="0"/>
-              </a:rPr>
-              <a:t>JCDL, New Jersey</a:t>
-            </a:r>
-            <a:endParaRPr lang="en-US" altLang="en-US" sz="2800" dirty="0" smtClean="0">
-              <a:latin typeface="Segoe UI" panose="020B0502040204020203" pitchFamily="34" charset="0"/>
-              <a:ea typeface="Segoe UI" panose="020B0502040204020203" pitchFamily="34" charset="0"/>
-              <a:cs typeface="Segoe UI" panose="020B0502040204020203" pitchFamily="34" charset="0"/>
-            </a:endParaRPr>
+              <a:t> – 16 @ JCDL, New Jersey</a:t>
+            </a:r>
           </a:p>
           <a:p>
             <a:pPr eaLnBrk="1" hangingPunct="1">
@@ -9392,15 +9358,7 @@
                 <a:ea typeface="Segoe UI" panose="020B0502040204020203" pitchFamily="34" charset="0"/>
                 <a:cs typeface="Segoe UI" panose="020B0502040204020203" pitchFamily="34" charset="0"/>
               </a:rPr>
-              <a:t> – 17 @ </a:t>
-            </a:r>
-            <a:r>
-              <a:rPr lang="en-US" altLang="en-US" sz="2800" dirty="0" smtClean="0">
-                <a:latin typeface="Segoe UI" panose="020B0502040204020203" pitchFamily="34" charset="0"/>
-                <a:ea typeface="Segoe UI" panose="020B0502040204020203" pitchFamily="34" charset="0"/>
-                <a:cs typeface="Segoe UI" panose="020B0502040204020203" pitchFamily="34" charset="0"/>
-              </a:rPr>
-              <a:t>SIGIR, Tokyo</a:t>
+              <a:t> – 17 @ SIGIR, Tokyo</a:t>
             </a:r>
             <a:endParaRPr lang="en-US" altLang="en-US" sz="2800" dirty="0">
               <a:latin typeface="Segoe UI" panose="020B0502040204020203" pitchFamily="34" charset="0"/>
@@ -9426,18 +9384,7 @@
                 <a:ea typeface="Segoe UI" panose="020B0502040204020203" pitchFamily="34" charset="0"/>
                 <a:cs typeface="Segoe UI" panose="020B0502040204020203" pitchFamily="34" charset="0"/>
               </a:rPr>
-              <a:t>Sign </a:t>
-            </a:r>
-            <a:r>
-              <a:rPr lang="en-US" altLang="en-US" sz="2800" b="1" dirty="0" smtClean="0">
-                <a:solidFill>
-                  <a:srgbClr val="C00000"/>
-                </a:solidFill>
-                <a:latin typeface="Segoe UI" panose="020B0502040204020203" pitchFamily="34" charset="0"/>
-                <a:ea typeface="Segoe UI" panose="020B0502040204020203" pitchFamily="34" charset="0"/>
-                <a:cs typeface="Segoe UI" panose="020B0502040204020203" pitchFamily="34" charset="0"/>
-              </a:rPr>
-              <a:t>up!</a:t>
+              <a:t>Sign up!</a:t>
             </a:r>
             <a:r>
               <a:rPr lang="en-US" altLang="en-US" sz="2800" dirty="0" smtClean="0">
@@ -9450,17 +9397,6 @@
               </a:rPr>
               <a:t> </a:t>
             </a:r>
-            <a:r>
-              <a:rPr lang="en-US" altLang="en-US" sz="2800" dirty="0" smtClean="0">
-                <a:solidFill>
-                  <a:srgbClr val="C00000"/>
-                </a:solidFill>
-                <a:latin typeface="Segoe UI" panose="020B0502040204020203" pitchFamily="34" charset="0"/>
-                <a:ea typeface="Segoe UI" panose="020B0502040204020203" pitchFamily="34" charset="0"/>
-                <a:cs typeface="Segoe UI" panose="020B0502040204020203" pitchFamily="34" charset="0"/>
-              </a:rPr>
-              <a:t/>
-            </a:r>
             <a:br>
               <a:rPr lang="en-US" altLang="en-US" sz="2800" dirty="0" smtClean="0">
                 <a:solidFill>
@@ -9480,29 +9416,7 @@
                 <a:ea typeface="Segoe UI" panose="020B0502040204020203" pitchFamily="34" charset="0"/>
                 <a:cs typeface="Segoe UI" panose="020B0502040204020203" pitchFamily="34" charset="0"/>
               </a:rPr>
-              <a:t>http</a:t>
-            </a:r>
-            <a:r>
-              <a:rPr lang="en-US" altLang="en-US" sz="2200" u="sng" dirty="0" smtClean="0">
-                <a:solidFill>
-                  <a:schemeClr val="accent2"/>
-                </a:solidFill>
-                <a:latin typeface="Segoe UI" panose="020B0502040204020203" pitchFamily="34" charset="0"/>
-                <a:ea typeface="Segoe UI" panose="020B0502040204020203" pitchFamily="34" charset="0"/>
-                <a:cs typeface="Segoe UI" panose="020B0502040204020203" pitchFamily="34" charset="0"/>
-              </a:rPr>
-              <a:t>://</a:t>
-            </a:r>
-            <a:r>
-              <a:rPr lang="en-US" altLang="en-US" sz="2200" u="sng" dirty="0" smtClean="0">
-                <a:solidFill>
-                  <a:schemeClr val="accent2"/>
-                </a:solidFill>
-                <a:latin typeface="Segoe UI" panose="020B0502040204020203" pitchFamily="34" charset="0"/>
-                <a:ea typeface="Segoe UI" panose="020B0502040204020203" pitchFamily="34" charset="0"/>
-                <a:cs typeface="Segoe UI" panose="020B0502040204020203" pitchFamily="34" charset="0"/>
-              </a:rPr>
-              <a:t>wing.comp.nus.edu.sg/cl-scisumm2017</a:t>
+              <a:t>http://wing.comp.nus.edu.sg/cl-scisumm2017</a:t>
             </a:r>
             <a:endParaRPr lang="en-US" altLang="en-US" sz="2200" u="sng" dirty="0" smtClean="0">
               <a:solidFill>

</xml_diff>